<commit_message>
fix no rights windaube bug
</commit_message>
<xml_diff>
--- a/projet4.pptx
+++ b/projet4.pptx
@@ -7,14 +7,18 @@
   <p:sldIdLst>
     <p:sldId id="256" r:id="rId2"/>
     <p:sldId id="257" r:id="rId3"/>
-    <p:sldId id="258" r:id="rId4"/>
-    <p:sldId id="259" r:id="rId5"/>
-    <p:sldId id="260" r:id="rId6"/>
-    <p:sldId id="261" r:id="rId7"/>
-    <p:sldId id="262" r:id="rId8"/>
-    <p:sldId id="265" r:id="rId9"/>
-    <p:sldId id="263" r:id="rId10"/>
-    <p:sldId id="264" r:id="rId11"/>
+    <p:sldId id="264" r:id="rId4"/>
+    <p:sldId id="268" r:id="rId5"/>
+    <p:sldId id="266" r:id="rId6"/>
+    <p:sldId id="270" r:id="rId7"/>
+    <p:sldId id="265" r:id="rId8"/>
+    <p:sldId id="271" r:id="rId9"/>
+    <p:sldId id="269" r:id="rId10"/>
+    <p:sldId id="275" r:id="rId11"/>
+    <p:sldId id="274" r:id="rId12"/>
+    <p:sldId id="273" r:id="rId13"/>
+    <p:sldId id="272" r:id="rId14"/>
+    <p:sldId id="276" r:id="rId15"/>
   </p:sldIdLst>
   <p:sldSz cx="9144000" cy="6858000" type="screen4x3"/>
   <p:notesSz cx="6858000" cy="9144000"/>
@@ -298,7 +302,7 @@
             <a:fld id="{AA309A6D-C09C-4548-B29A-6CF363A7E532}" type="datetimeFigureOut">
               <a:rPr lang="fr-FR" smtClean="0"/>
               <a:pPr/>
-              <a:t>22/09/2021</a:t>
+              <a:t>06/10/2021</a:t>
             </a:fld>
             <a:endParaRPr lang="fr-BE"/>
           </a:p>
@@ -465,7 +469,7 @@
             <a:fld id="{AA309A6D-C09C-4548-B29A-6CF363A7E532}" type="datetimeFigureOut">
               <a:rPr lang="fr-FR" smtClean="0"/>
               <a:pPr/>
-              <a:t>22/09/2021</a:t>
+              <a:t>06/10/2021</a:t>
             </a:fld>
             <a:endParaRPr lang="fr-BE"/>
           </a:p>
@@ -642,7 +646,7 @@
             <a:fld id="{AA309A6D-C09C-4548-B29A-6CF363A7E532}" type="datetimeFigureOut">
               <a:rPr lang="fr-FR" smtClean="0"/>
               <a:pPr/>
-              <a:t>22/09/2021</a:t>
+              <a:t>06/10/2021</a:t>
             </a:fld>
             <a:endParaRPr lang="fr-BE"/>
           </a:p>
@@ -809,7 +813,7 @@
             <a:fld id="{AA309A6D-C09C-4548-B29A-6CF363A7E532}" type="datetimeFigureOut">
               <a:rPr lang="fr-FR" smtClean="0"/>
               <a:pPr/>
-              <a:t>22/09/2021</a:t>
+              <a:t>06/10/2021</a:t>
             </a:fld>
             <a:endParaRPr lang="fr-BE"/>
           </a:p>
@@ -1052,7 +1056,7 @@
             <a:fld id="{AA309A6D-C09C-4548-B29A-6CF363A7E532}" type="datetimeFigureOut">
               <a:rPr lang="fr-FR" smtClean="0"/>
               <a:pPr/>
-              <a:t>22/09/2021</a:t>
+              <a:t>06/10/2021</a:t>
             </a:fld>
             <a:endParaRPr lang="fr-BE"/>
           </a:p>
@@ -1337,7 +1341,7 @@
             <a:fld id="{AA309A6D-C09C-4548-B29A-6CF363A7E532}" type="datetimeFigureOut">
               <a:rPr lang="fr-FR" smtClean="0"/>
               <a:pPr/>
-              <a:t>22/09/2021</a:t>
+              <a:t>06/10/2021</a:t>
             </a:fld>
             <a:endParaRPr lang="fr-BE"/>
           </a:p>
@@ -1756,7 +1760,7 @@
             <a:fld id="{AA309A6D-C09C-4548-B29A-6CF363A7E532}" type="datetimeFigureOut">
               <a:rPr lang="fr-FR" smtClean="0"/>
               <a:pPr/>
-              <a:t>22/09/2021</a:t>
+              <a:t>06/10/2021</a:t>
             </a:fld>
             <a:endParaRPr lang="fr-BE"/>
           </a:p>
@@ -1871,7 +1875,7 @@
             <a:fld id="{AA309A6D-C09C-4548-B29A-6CF363A7E532}" type="datetimeFigureOut">
               <a:rPr lang="fr-FR" smtClean="0"/>
               <a:pPr/>
-              <a:t>22/09/2021</a:t>
+              <a:t>06/10/2021</a:t>
             </a:fld>
             <a:endParaRPr lang="fr-BE"/>
           </a:p>
@@ -1963,7 +1967,7 @@
             <a:fld id="{AA309A6D-C09C-4548-B29A-6CF363A7E532}" type="datetimeFigureOut">
               <a:rPr lang="fr-FR" smtClean="0"/>
               <a:pPr/>
-              <a:t>22/09/2021</a:t>
+              <a:t>06/10/2021</a:t>
             </a:fld>
             <a:endParaRPr lang="fr-BE"/>
           </a:p>
@@ -2237,7 +2241,7 @@
             <a:fld id="{AA309A6D-C09C-4548-B29A-6CF363A7E532}" type="datetimeFigureOut">
               <a:rPr lang="fr-FR" smtClean="0"/>
               <a:pPr/>
-              <a:t>22/09/2021</a:t>
+              <a:t>06/10/2021</a:t>
             </a:fld>
             <a:endParaRPr lang="fr-BE"/>
           </a:p>
@@ -2487,7 +2491,7 @@
             <a:fld id="{AA309A6D-C09C-4548-B29A-6CF363A7E532}" type="datetimeFigureOut">
               <a:rPr lang="fr-FR" smtClean="0"/>
               <a:pPr/>
-              <a:t>22/09/2021</a:t>
+              <a:t>06/10/2021</a:t>
             </a:fld>
             <a:endParaRPr lang="fr-BE"/>
           </a:p>
@@ -2697,7 +2701,7 @@
             <a:fld id="{AA309A6D-C09C-4548-B29A-6CF363A7E532}" type="datetimeFigureOut">
               <a:rPr lang="fr-FR" smtClean="0"/>
               <a:pPr/>
-              <a:t>22/09/2021</a:t>
+              <a:t>06/10/2021</a:t>
             </a:fld>
             <a:endParaRPr lang="fr-BE"/>
           </a:p>
@@ -3156,6 +3160,488 @@
           <a:chExt cx="0" cy="0"/>
         </a:xfrm>
       </p:grpSpPr>
+      <p:pic>
+        <p:nvPicPr>
+          <p:cNvPr id="7170" name="Picture 2"/>
+          <p:cNvPicPr>
+            <a:picLocks noChangeAspect="1" noChangeArrowheads="1"/>
+          </p:cNvPicPr>
+          <p:nvPr/>
+        </p:nvPicPr>
+        <p:blipFill>
+          <a:blip r:embed="rId2" cstate="print"/>
+          <a:srcRect/>
+          <a:stretch>
+            <a:fillRect/>
+          </a:stretch>
+        </p:blipFill>
+        <p:spPr bwMode="auto">
+          <a:xfrm>
+            <a:off x="1365250" y="1495425"/>
+            <a:ext cx="6411913" cy="3876675"/>
+          </a:xfrm>
+          <a:prstGeom prst="rect">
+            <a:avLst/>
+          </a:prstGeom>
+          <a:noFill/>
+          <a:ln w="9525">
+            <a:noFill/>
+            <a:miter lim="800000"/>
+            <a:headEnd/>
+            <a:tailEnd/>
+          </a:ln>
+          <a:effectLst/>
+        </p:spPr>
+      </p:pic>
+    </p:spTree>
+  </p:cSld>
+  <p:clrMapOvr>
+    <a:masterClrMapping/>
+  </p:clrMapOvr>
+</p:sld>
+</file>
+
+<file path=ppt/slides/slide11.xml><?xml version="1.0" encoding="utf-8"?>
+<p:sld xmlns:a="http://schemas.openxmlformats.org/drawingml/2006/main" xmlns:r="http://schemas.openxmlformats.org/officeDocument/2006/relationships" xmlns:p="http://schemas.openxmlformats.org/presentationml/2006/main">
+  <p:cSld>
+    <p:spTree>
+      <p:nvGrpSpPr>
+        <p:cNvPr id="1" name=""/>
+        <p:cNvGrpSpPr/>
+        <p:nvPr/>
+      </p:nvGrpSpPr>
+      <p:grpSpPr>
+        <a:xfrm>
+          <a:off x="0" y="0"/>
+          <a:ext cx="0" cy="0"/>
+          <a:chOff x="0" y="0"/>
+          <a:chExt cx="0" cy="0"/>
+        </a:xfrm>
+      </p:grpSpPr>
+      <p:pic>
+        <p:nvPicPr>
+          <p:cNvPr id="6146" name="Picture 2"/>
+          <p:cNvPicPr>
+            <a:picLocks noChangeAspect="1" noChangeArrowheads="1"/>
+          </p:cNvPicPr>
+          <p:nvPr/>
+        </p:nvPicPr>
+        <p:blipFill>
+          <a:blip r:embed="rId2" cstate="print"/>
+          <a:srcRect/>
+          <a:stretch>
+            <a:fillRect/>
+          </a:stretch>
+        </p:blipFill>
+        <p:spPr bwMode="auto">
+          <a:xfrm>
+            <a:off x="1050925" y="508000"/>
+            <a:ext cx="7040563" cy="5849938"/>
+          </a:xfrm>
+          <a:prstGeom prst="rect">
+            <a:avLst/>
+          </a:prstGeom>
+          <a:noFill/>
+          <a:ln w="9525">
+            <a:noFill/>
+            <a:miter lim="800000"/>
+            <a:headEnd/>
+            <a:tailEnd/>
+          </a:ln>
+          <a:effectLst/>
+        </p:spPr>
+      </p:pic>
+    </p:spTree>
+  </p:cSld>
+  <p:clrMapOvr>
+    <a:masterClrMapping/>
+  </p:clrMapOvr>
+</p:sld>
+</file>
+
+<file path=ppt/slides/slide12.xml><?xml version="1.0" encoding="utf-8"?>
+<p:sld xmlns:a="http://schemas.openxmlformats.org/drawingml/2006/main" xmlns:r="http://schemas.openxmlformats.org/officeDocument/2006/relationships" xmlns:p="http://schemas.openxmlformats.org/presentationml/2006/main">
+  <p:cSld>
+    <p:spTree>
+      <p:nvGrpSpPr>
+        <p:cNvPr id="1" name=""/>
+        <p:cNvGrpSpPr/>
+        <p:nvPr/>
+      </p:nvGrpSpPr>
+      <p:grpSpPr>
+        <a:xfrm>
+          <a:off x="0" y="0"/>
+          <a:ext cx="0" cy="0"/>
+          <a:chOff x="0" y="0"/>
+          <a:chExt cx="0" cy="0"/>
+        </a:xfrm>
+      </p:grpSpPr>
+      <p:sp>
+        <p:nvSpPr>
+          <p:cNvPr id="5" name="Titre 1"/>
+          <p:cNvSpPr txBox="1">
+            <a:spLocks/>
+          </p:cNvSpPr>
+          <p:nvPr/>
+        </p:nvSpPr>
+        <p:spPr>
+          <a:xfrm>
+            <a:off x="457200" y="274638"/>
+            <a:ext cx="8229600" cy="1143000"/>
+          </a:xfrm>
+          <a:prstGeom prst="rect">
+            <a:avLst/>
+          </a:prstGeom>
+        </p:spPr>
+        <p:txBody>
+          <a:bodyPr/>
+          <a:lstStyle/>
+          <a:p>
+            <a:pPr marL="0" marR="0" lvl="0" indent="0" algn="ctr" defTabSz="914400" rtl="0" eaLnBrk="1" fontAlgn="auto" latinLnBrk="0" hangingPunct="1">
+              <a:lnSpc>
+                <a:spcPct val="100000"/>
+              </a:lnSpc>
+              <a:spcBef>
+                <a:spcPct val="0"/>
+              </a:spcBef>
+              <a:spcAft>
+                <a:spcPts val="0"/>
+              </a:spcAft>
+              <a:buClrTx/>
+              <a:buSzTx/>
+              <a:buFontTx/>
+              <a:buNone/>
+              <a:tabLst/>
+              <a:defRPr/>
+            </a:pPr>
+            <a:r>
+              <a:rPr lang="fr-FR" sz="2800" noProof="0" dirty="0" smtClean="0">
+                <a:latin typeface="+mj-lt"/>
+                <a:ea typeface="+mj-ea"/>
+                <a:cs typeface="+mj-cs"/>
+              </a:rPr>
+              <a:t>Indexation</a:t>
+            </a:r>
+            <a:endParaRPr kumimoji="0" lang="fr-FR" sz="2800" b="0" i="0" u="none" strike="noStrike" kern="1200" cap="none" spc="0" normalizeH="0" baseline="0" noProof="0" dirty="0">
+              <a:ln>
+                <a:noFill/>
+              </a:ln>
+              <a:solidFill>
+                <a:schemeClr val="tx1"/>
+              </a:solidFill>
+              <a:effectLst/>
+              <a:uLnTx/>
+              <a:uFillTx/>
+              <a:latin typeface="+mj-lt"/>
+              <a:ea typeface="+mj-ea"/>
+              <a:cs typeface="+mj-cs"/>
+            </a:endParaRPr>
+          </a:p>
+        </p:txBody>
+      </p:sp>
+      <p:pic>
+        <p:nvPicPr>
+          <p:cNvPr id="6" name="Picture 2"/>
+          <p:cNvPicPr>
+            <a:picLocks noChangeAspect="1" noChangeArrowheads="1"/>
+          </p:cNvPicPr>
+          <p:nvPr/>
+        </p:nvPicPr>
+        <p:blipFill>
+          <a:blip r:embed="rId2" cstate="print"/>
+          <a:srcRect/>
+          <a:stretch>
+            <a:fillRect/>
+          </a:stretch>
+        </p:blipFill>
+        <p:spPr bwMode="auto">
+          <a:xfrm>
+            <a:off x="611560" y="2636912"/>
+            <a:ext cx="7897837" cy="1296144"/>
+          </a:xfrm>
+          <a:prstGeom prst="rect">
+            <a:avLst/>
+          </a:prstGeom>
+          <a:noFill/>
+          <a:ln w="9525">
+            <a:noFill/>
+            <a:miter lim="800000"/>
+            <a:headEnd/>
+            <a:tailEnd/>
+          </a:ln>
+          <a:effectLst/>
+        </p:spPr>
+      </p:pic>
+    </p:spTree>
+  </p:cSld>
+  <p:clrMapOvr>
+    <a:masterClrMapping/>
+  </p:clrMapOvr>
+</p:sld>
+</file>
+
+<file path=ppt/slides/slide13.xml><?xml version="1.0" encoding="utf-8"?>
+<p:sld xmlns:a="http://schemas.openxmlformats.org/drawingml/2006/main" xmlns:r="http://schemas.openxmlformats.org/officeDocument/2006/relationships" xmlns:p="http://schemas.openxmlformats.org/presentationml/2006/main">
+  <p:cSld>
+    <p:spTree>
+      <p:nvGrpSpPr>
+        <p:cNvPr id="1" name=""/>
+        <p:cNvGrpSpPr/>
+        <p:nvPr/>
+      </p:nvGrpSpPr>
+      <p:grpSpPr>
+        <a:xfrm>
+          <a:off x="0" y="0"/>
+          <a:ext cx="0" cy="0"/>
+          <a:chOff x="0" y="0"/>
+          <a:chExt cx="0" cy="0"/>
+        </a:xfrm>
+      </p:grpSpPr>
+      <p:pic>
+        <p:nvPicPr>
+          <p:cNvPr id="3074" name="Picture 2"/>
+          <p:cNvPicPr>
+            <a:picLocks noChangeAspect="1" noChangeArrowheads="1"/>
+          </p:cNvPicPr>
+          <p:nvPr/>
+        </p:nvPicPr>
+        <p:blipFill>
+          <a:blip r:embed="rId2" cstate="print"/>
+          <a:srcRect/>
+          <a:stretch>
+            <a:fillRect/>
+          </a:stretch>
+        </p:blipFill>
+        <p:spPr bwMode="auto">
+          <a:xfrm>
+            <a:off x="0" y="1700808"/>
+            <a:ext cx="9144000" cy="1523784"/>
+          </a:xfrm>
+          <a:prstGeom prst="rect">
+            <a:avLst/>
+          </a:prstGeom>
+          <a:noFill/>
+          <a:ln w="9525">
+            <a:noFill/>
+            <a:miter lim="800000"/>
+            <a:headEnd/>
+            <a:tailEnd/>
+          </a:ln>
+          <a:effectLst/>
+        </p:spPr>
+      </p:pic>
+      <p:sp>
+        <p:nvSpPr>
+          <p:cNvPr id="5" name="Titre 1"/>
+          <p:cNvSpPr txBox="1">
+            <a:spLocks/>
+          </p:cNvSpPr>
+          <p:nvPr/>
+        </p:nvSpPr>
+        <p:spPr>
+          <a:xfrm>
+            <a:off x="457200" y="274638"/>
+            <a:ext cx="8229600" cy="1143000"/>
+          </a:xfrm>
+          <a:prstGeom prst="rect">
+            <a:avLst/>
+          </a:prstGeom>
+        </p:spPr>
+        <p:txBody>
+          <a:bodyPr/>
+          <a:lstStyle/>
+          <a:p>
+            <a:pPr marL="0" marR="0" lvl="0" indent="0" algn="ctr" defTabSz="914400" rtl="0" eaLnBrk="1" fontAlgn="auto" latinLnBrk="0" hangingPunct="1">
+              <a:lnSpc>
+                <a:spcPct val="100000"/>
+              </a:lnSpc>
+              <a:spcBef>
+                <a:spcPct val="0"/>
+              </a:spcBef>
+              <a:spcAft>
+                <a:spcPts val="0"/>
+              </a:spcAft>
+              <a:buClrTx/>
+              <a:buSzTx/>
+              <a:buFontTx/>
+              <a:buNone/>
+              <a:tabLst/>
+              <a:defRPr/>
+            </a:pPr>
+            <a:r>
+              <a:rPr lang="fr-FR" sz="2800" dirty="0" smtClean="0">
+                <a:latin typeface="+mj-lt"/>
+                <a:ea typeface="+mj-ea"/>
+                <a:cs typeface="+mj-cs"/>
+              </a:rPr>
+              <a:t>Meta description</a:t>
+            </a:r>
+            <a:endParaRPr kumimoji="0" lang="fr-FR" sz="2800" b="0" i="0" u="none" strike="noStrike" kern="1200" cap="none" spc="0" normalizeH="0" baseline="0" noProof="0" dirty="0">
+              <a:ln>
+                <a:noFill/>
+              </a:ln>
+              <a:solidFill>
+                <a:schemeClr val="tx1"/>
+              </a:solidFill>
+              <a:effectLst/>
+              <a:uLnTx/>
+              <a:uFillTx/>
+              <a:latin typeface="+mj-lt"/>
+              <a:ea typeface="+mj-ea"/>
+              <a:cs typeface="+mj-cs"/>
+            </a:endParaRPr>
+          </a:p>
+        </p:txBody>
+      </p:sp>
+      <p:pic>
+        <p:nvPicPr>
+          <p:cNvPr id="3075" name="Picture 3"/>
+          <p:cNvPicPr>
+            <a:picLocks noChangeAspect="1" noChangeArrowheads="1"/>
+          </p:cNvPicPr>
+          <p:nvPr/>
+        </p:nvPicPr>
+        <p:blipFill>
+          <a:blip r:embed="rId3" cstate="print"/>
+          <a:srcRect/>
+          <a:stretch>
+            <a:fillRect/>
+          </a:stretch>
+        </p:blipFill>
+        <p:spPr bwMode="auto">
+          <a:xfrm>
+            <a:off x="0" y="4221087"/>
+            <a:ext cx="9144000" cy="936105"/>
+          </a:xfrm>
+          <a:prstGeom prst="rect">
+            <a:avLst/>
+          </a:prstGeom>
+          <a:noFill/>
+          <a:ln w="9525">
+            <a:noFill/>
+            <a:miter lim="800000"/>
+            <a:headEnd/>
+            <a:tailEnd/>
+          </a:ln>
+          <a:effectLst/>
+        </p:spPr>
+      </p:pic>
+    </p:spTree>
+  </p:cSld>
+  <p:clrMapOvr>
+    <a:masterClrMapping/>
+  </p:clrMapOvr>
+</p:sld>
+</file>
+
+<file path=ppt/slides/slide14.xml><?xml version="1.0" encoding="utf-8"?>
+<p:sld xmlns:a="http://schemas.openxmlformats.org/drawingml/2006/main" xmlns:r="http://schemas.openxmlformats.org/officeDocument/2006/relationships" xmlns:p="http://schemas.openxmlformats.org/presentationml/2006/main">
+  <p:cSld>
+    <p:spTree>
+      <p:nvGrpSpPr>
+        <p:cNvPr id="1" name=""/>
+        <p:cNvGrpSpPr/>
+        <p:nvPr/>
+      </p:nvGrpSpPr>
+      <p:grpSpPr>
+        <a:xfrm>
+          <a:off x="0" y="0"/>
+          <a:ext cx="0" cy="0"/>
+          <a:chOff x="0" y="0"/>
+          <a:chExt cx="0" cy="0"/>
+        </a:xfrm>
+      </p:grpSpPr>
+      <p:sp>
+        <p:nvSpPr>
+          <p:cNvPr id="2" name="Titre 1"/>
+          <p:cNvSpPr>
+            <a:spLocks noGrp="1"/>
+          </p:cNvSpPr>
+          <p:nvPr>
+            <p:ph type="title"/>
+          </p:nvPr>
+        </p:nvSpPr>
+        <p:spPr/>
+        <p:txBody>
+          <a:bodyPr>
+            <a:normAutofit/>
+          </a:bodyPr>
+          <a:lstStyle/>
+          <a:p>
+            <a:r>
+              <a:rPr lang="fr-FR" sz="2800" dirty="0" smtClean="0"/>
+              <a:t>Analyse des performances avec Lighthouse</a:t>
+            </a:r>
+            <a:endParaRPr lang="fr-FR" sz="2800" dirty="0"/>
+          </a:p>
+        </p:txBody>
+      </p:sp>
+      <p:pic>
+        <p:nvPicPr>
+          <p:cNvPr id="8194" name="Picture 2"/>
+          <p:cNvPicPr>
+            <a:picLocks noChangeAspect="1" noChangeArrowheads="1"/>
+          </p:cNvPicPr>
+          <p:nvPr/>
+        </p:nvPicPr>
+        <p:blipFill>
+          <a:blip r:embed="rId2" cstate="print"/>
+          <a:srcRect/>
+          <a:stretch>
+            <a:fillRect/>
+          </a:stretch>
+        </p:blipFill>
+        <p:spPr bwMode="auto">
+          <a:xfrm>
+            <a:off x="0" y="1412776"/>
+            <a:ext cx="9144000" cy="2409428"/>
+          </a:xfrm>
+          <a:prstGeom prst="rect">
+            <a:avLst/>
+          </a:prstGeom>
+          <a:noFill/>
+          <a:ln w="9525">
+            <a:noFill/>
+            <a:miter lim="800000"/>
+            <a:headEnd/>
+            <a:tailEnd/>
+          </a:ln>
+          <a:effectLst/>
+        </p:spPr>
+      </p:pic>
+      <p:pic>
+        <p:nvPicPr>
+          <p:cNvPr id="8195" name="Picture 3"/>
+          <p:cNvPicPr>
+            <a:picLocks noChangeAspect="1" noChangeArrowheads="1"/>
+          </p:cNvPicPr>
+          <p:nvPr/>
+        </p:nvPicPr>
+        <p:blipFill>
+          <a:blip r:embed="rId3" cstate="print"/>
+          <a:srcRect/>
+          <a:stretch>
+            <a:fillRect/>
+          </a:stretch>
+        </p:blipFill>
+        <p:spPr bwMode="auto">
+          <a:xfrm>
+            <a:off x="0" y="3933056"/>
+            <a:ext cx="9144000" cy="2746393"/>
+          </a:xfrm>
+          <a:prstGeom prst="rect">
+            <a:avLst/>
+          </a:prstGeom>
+          <a:noFill/>
+          <a:ln w="9525">
+            <a:noFill/>
+            <a:miter lim="800000"/>
+            <a:headEnd/>
+            <a:tailEnd/>
+          </a:ln>
+          <a:effectLst/>
+        </p:spPr>
+      </p:pic>
     </p:spTree>
   </p:cSld>
   <p:clrMapOvr>
@@ -3204,6 +3690,130 @@
           </a:p>
         </p:txBody>
       </p:sp>
+      <p:sp>
+        <p:nvSpPr>
+          <p:cNvPr id="4" name="ZoneTexte 3"/>
+          <p:cNvSpPr txBox="1"/>
+          <p:nvPr/>
+        </p:nvSpPr>
+        <p:spPr>
+          <a:xfrm>
+            <a:off x="1403648" y="1700808"/>
+            <a:ext cx="6408712" cy="5196166"/>
+          </a:xfrm>
+          <a:prstGeom prst="rect">
+            <a:avLst/>
+          </a:prstGeom>
+          <a:noFill/>
+        </p:spPr>
+        <p:txBody>
+          <a:bodyPr wrap="square" rtlCol="0">
+            <a:spAutoFit/>
+          </a:bodyPr>
+          <a:lstStyle/>
+          <a:p>
+            <a:pPr>
+              <a:lnSpc>
+                <a:spcPct val="150000"/>
+              </a:lnSpc>
+              <a:buFont typeface="Arial" pitchFamily="34" charset="0"/>
+              <a:buChar char="•"/>
+            </a:pPr>
+            <a:r>
+              <a:rPr lang="fr-FR" sz="2800" dirty="0" smtClean="0"/>
+              <a:t>La sémantique</a:t>
+            </a:r>
+          </a:p>
+          <a:p>
+            <a:pPr>
+              <a:lnSpc>
+                <a:spcPct val="150000"/>
+              </a:lnSpc>
+              <a:buFont typeface="Arial" pitchFamily="34" charset="0"/>
+              <a:buChar char="•"/>
+            </a:pPr>
+            <a:r>
+              <a:rPr lang="fr-FR" sz="2800" dirty="0" smtClean="0"/>
+              <a:t> Textes et images</a:t>
+            </a:r>
+          </a:p>
+          <a:p>
+            <a:pPr>
+              <a:lnSpc>
+                <a:spcPct val="150000"/>
+              </a:lnSpc>
+              <a:buFont typeface="Arial" pitchFamily="34" charset="0"/>
+              <a:buChar char="•"/>
+            </a:pPr>
+            <a:r>
+              <a:rPr lang="fr-FR" sz="2800" dirty="0" smtClean="0"/>
+              <a:t> Alt des images</a:t>
+            </a:r>
+          </a:p>
+          <a:p>
+            <a:pPr>
+              <a:lnSpc>
+                <a:spcPct val="150000"/>
+              </a:lnSpc>
+              <a:buFont typeface="Arial" pitchFamily="34" charset="0"/>
+              <a:buChar char="•"/>
+            </a:pPr>
+            <a:r>
+              <a:rPr lang="fr-FR" sz="2800" dirty="0" smtClean="0"/>
+              <a:t> Le contraste</a:t>
+            </a:r>
+          </a:p>
+          <a:p>
+            <a:pPr>
+              <a:lnSpc>
+                <a:spcPct val="150000"/>
+              </a:lnSpc>
+              <a:buFont typeface="Arial" pitchFamily="34" charset="0"/>
+              <a:buChar char="•"/>
+            </a:pPr>
+            <a:r>
+              <a:rPr lang="fr-FR" sz="2800" dirty="0" smtClean="0"/>
+              <a:t> Le contenu</a:t>
+            </a:r>
+          </a:p>
+          <a:p>
+            <a:pPr>
+              <a:lnSpc>
+                <a:spcPct val="150000"/>
+              </a:lnSpc>
+              <a:buFont typeface="Arial" pitchFamily="34" charset="0"/>
+              <a:buChar char="•"/>
+            </a:pPr>
+            <a:r>
+              <a:rPr lang="fr-FR" sz="2800" dirty="0" smtClean="0"/>
+              <a:t> Indexation</a:t>
+            </a:r>
+          </a:p>
+          <a:p>
+            <a:pPr>
+              <a:lnSpc>
+                <a:spcPct val="150000"/>
+              </a:lnSpc>
+              <a:buFont typeface="Arial" pitchFamily="34" charset="0"/>
+              <a:buChar char="•"/>
+            </a:pPr>
+            <a:r>
+              <a:rPr lang="fr-FR" sz="2800" dirty="0" smtClean="0"/>
+              <a:t> Lighthouse</a:t>
+            </a:r>
+          </a:p>
+          <a:p>
+            <a:pPr>
+              <a:lnSpc>
+                <a:spcPct val="150000"/>
+              </a:lnSpc>
+              <a:buFont typeface="Arial" pitchFamily="34" charset="0"/>
+              <a:buChar char="•"/>
+            </a:pPr>
+            <a:endParaRPr lang="fr-FR" sz="2800" dirty="0"/>
+          </a:p>
+        </p:txBody>
+      </p:sp>
     </p:spTree>
   </p:cSld>
   <p:clrMapOvr>
@@ -3231,30 +3841,70 @@
       </p:grpSpPr>
       <p:sp>
         <p:nvSpPr>
-          <p:cNvPr id="2" name="Titre 1"/>
-          <p:cNvSpPr>
-            <a:spLocks noGrp="1"/>
-          </p:cNvSpPr>
-          <p:nvPr>
-            <p:ph type="title"/>
-          </p:nvPr>
-        </p:nvSpPr>
-        <p:spPr/>
-        <p:txBody>
-          <a:bodyPr/>
-          <a:lstStyle/>
-          <a:p>
-            <a:r>
-              <a:rPr lang="fr-FR" dirty="0" smtClean="0"/>
-              <a:t>Les images en web</a:t>
-            </a:r>
-            <a:endParaRPr lang="fr-FR" dirty="0"/>
+          <p:cNvPr id="3" name="Titre 1"/>
+          <p:cNvSpPr txBox="1">
+            <a:spLocks/>
+          </p:cNvSpPr>
+          <p:nvPr/>
+        </p:nvSpPr>
+        <p:spPr>
+          <a:xfrm>
+            <a:off x="457200" y="274638"/>
+            <a:ext cx="8229600" cy="1143000"/>
+          </a:xfrm>
+          <a:prstGeom prst="rect">
+            <a:avLst/>
+          </a:prstGeom>
+        </p:spPr>
+        <p:txBody>
+          <a:bodyPr/>
+          <a:lstStyle/>
+          <a:p>
+            <a:pPr marL="0" marR="0" lvl="0" indent="0" algn="ctr" defTabSz="914400" rtl="0" eaLnBrk="1" fontAlgn="auto" latinLnBrk="0" hangingPunct="1">
+              <a:lnSpc>
+                <a:spcPct val="100000"/>
+              </a:lnSpc>
+              <a:spcBef>
+                <a:spcPct val="0"/>
+              </a:spcBef>
+              <a:spcAft>
+                <a:spcPts val="0"/>
+              </a:spcAft>
+              <a:buClrTx/>
+              <a:buSzTx/>
+              <a:buFontTx/>
+              <a:buNone/>
+              <a:tabLst/>
+              <a:defRPr/>
+            </a:pPr>
+            <a:r>
+              <a:rPr lang="fr-FR" sz="2800" noProof="0" dirty="0" smtClean="0">
+                <a:latin typeface="+mj-lt"/>
+                <a:ea typeface="+mj-ea"/>
+                <a:cs typeface="+mj-cs"/>
+              </a:rPr>
+              <a:t>La sémantique</a:t>
+            </a:r>
+            <a:endParaRPr kumimoji="0" lang="fr-FR" sz="2800" b="0" i="0" u="none" strike="noStrike" kern="1200" cap="none" spc="0" normalizeH="0" baseline="0" noProof="0" dirty="0">
+              <a:ln>
+                <a:noFill/>
+              </a:ln>
+              <a:solidFill>
+                <a:schemeClr val="tx1"/>
+              </a:solidFill>
+              <a:effectLst/>
+              <a:uLnTx/>
+              <a:uFillTx/>
+              <a:latin typeface="+mj-lt"/>
+              <a:ea typeface="+mj-ea"/>
+              <a:cs typeface="+mj-cs"/>
+            </a:endParaRPr>
           </a:p>
         </p:txBody>
       </p:sp>
       <p:pic>
         <p:nvPicPr>
-          <p:cNvPr id="1029" name="Picture 5"/>
+          <p:cNvPr id="4098" name="Picture 2"/>
           <p:cNvPicPr>
             <a:picLocks noChangeAspect="1" noChangeArrowheads="1"/>
           </p:cNvPicPr>
@@ -3269,8 +3919,8 @@
         </p:blipFill>
         <p:spPr bwMode="auto">
           <a:xfrm>
-            <a:off x="899592" y="1772816"/>
-            <a:ext cx="7344815" cy="972723"/>
+            <a:off x="251520" y="1124744"/>
+            <a:ext cx="8650287" cy="1219200"/>
           </a:xfrm>
           <a:prstGeom prst="rect">
             <a:avLst/>
@@ -3287,7 +3937,7 @@
       </p:pic>
       <p:pic>
         <p:nvPicPr>
-          <p:cNvPr id="1030" name="Picture 6"/>
+          <p:cNvPr id="4099" name="Picture 3"/>
           <p:cNvPicPr>
             <a:picLocks noChangeAspect="1" noChangeArrowheads="1"/>
           </p:cNvPicPr>
@@ -3302,8 +3952,8 @@
         </p:blipFill>
         <p:spPr bwMode="auto">
           <a:xfrm>
-            <a:off x="1115616" y="3789040"/>
-            <a:ext cx="6926612" cy="1794123"/>
+            <a:off x="0" y="3284984"/>
+            <a:ext cx="9144001" cy="1008112"/>
           </a:xfrm>
           <a:prstGeom prst="rect">
             <a:avLst/>
@@ -3327,6 +3977,226 @@
 </file>
 
 <file path=ppt/slides/slide4.xml><?xml version="1.0" encoding="utf-8"?>
+<p:sld xmlns:a="http://schemas.openxmlformats.org/drawingml/2006/main" xmlns:r="http://schemas.openxmlformats.org/officeDocument/2006/relationships" xmlns:p="http://schemas.openxmlformats.org/presentationml/2006/main">
+  <p:cSld>
+    <p:spTree>
+      <p:nvGrpSpPr>
+        <p:cNvPr id="1" name=""/>
+        <p:cNvGrpSpPr/>
+        <p:nvPr/>
+      </p:nvGrpSpPr>
+      <p:grpSpPr>
+        <a:xfrm>
+          <a:off x="0" y="0"/>
+          <a:ext cx="0" cy="0"/>
+          <a:chOff x="0" y="0"/>
+          <a:chExt cx="0" cy="0"/>
+        </a:xfrm>
+      </p:grpSpPr>
+      <p:sp>
+        <p:nvSpPr>
+          <p:cNvPr id="2" name="Titre 1"/>
+          <p:cNvSpPr txBox="1">
+            <a:spLocks/>
+          </p:cNvSpPr>
+          <p:nvPr/>
+        </p:nvSpPr>
+        <p:spPr>
+          <a:xfrm>
+            <a:off x="457200" y="274638"/>
+            <a:ext cx="8229600" cy="1143000"/>
+          </a:xfrm>
+          <a:prstGeom prst="rect">
+            <a:avLst/>
+          </a:prstGeom>
+        </p:spPr>
+        <p:txBody>
+          <a:bodyPr/>
+          <a:lstStyle/>
+          <a:p>
+            <a:pPr marL="0" marR="0" lvl="0" indent="0" algn="ctr" defTabSz="914400" rtl="0" eaLnBrk="1" fontAlgn="auto" latinLnBrk="0" hangingPunct="1">
+              <a:lnSpc>
+                <a:spcPct val="100000"/>
+              </a:lnSpc>
+              <a:spcBef>
+                <a:spcPct val="0"/>
+              </a:spcBef>
+              <a:spcAft>
+                <a:spcPts val="0"/>
+              </a:spcAft>
+              <a:buClrTx/>
+              <a:buSzTx/>
+              <a:buFontTx/>
+              <a:buNone/>
+              <a:tabLst/>
+              <a:defRPr/>
+            </a:pPr>
+            <a:r>
+              <a:rPr lang="fr-FR" sz="2800" dirty="0" smtClean="0">
+                <a:latin typeface="+mj-lt"/>
+                <a:ea typeface="+mj-ea"/>
+                <a:cs typeface="+mj-cs"/>
+              </a:rPr>
+              <a:t>Textes et images</a:t>
+            </a:r>
+            <a:endParaRPr kumimoji="0" lang="fr-FR" sz="2800" b="0" i="0" u="none" strike="noStrike" kern="1200" cap="none" spc="0" normalizeH="0" baseline="0" noProof="0" dirty="0">
+              <a:ln>
+                <a:noFill/>
+              </a:ln>
+              <a:solidFill>
+                <a:schemeClr val="tx1"/>
+              </a:solidFill>
+              <a:effectLst/>
+              <a:uLnTx/>
+              <a:uFillTx/>
+              <a:latin typeface="+mj-lt"/>
+              <a:ea typeface="+mj-ea"/>
+              <a:cs typeface="+mj-cs"/>
+            </a:endParaRPr>
+          </a:p>
+        </p:txBody>
+      </p:sp>
+      <p:pic>
+        <p:nvPicPr>
+          <p:cNvPr id="3" name="Picture 5"/>
+          <p:cNvPicPr>
+            <a:picLocks noChangeAspect="1" noChangeArrowheads="1"/>
+          </p:cNvPicPr>
+          <p:nvPr/>
+        </p:nvPicPr>
+        <p:blipFill>
+          <a:blip r:embed="rId2" cstate="print"/>
+          <a:srcRect/>
+          <a:stretch>
+            <a:fillRect/>
+          </a:stretch>
+        </p:blipFill>
+        <p:spPr bwMode="auto">
+          <a:xfrm>
+            <a:off x="899592" y="1268760"/>
+            <a:ext cx="7344815" cy="972723"/>
+          </a:xfrm>
+          <a:prstGeom prst="rect">
+            <a:avLst/>
+          </a:prstGeom>
+          <a:noFill/>
+          <a:ln w="9525">
+            <a:noFill/>
+            <a:miter lim="800000"/>
+            <a:headEnd/>
+            <a:tailEnd/>
+          </a:ln>
+          <a:effectLst/>
+        </p:spPr>
+      </p:pic>
+      <p:pic>
+        <p:nvPicPr>
+          <p:cNvPr id="4" name="Picture 6"/>
+          <p:cNvPicPr>
+            <a:picLocks noChangeAspect="1" noChangeArrowheads="1"/>
+          </p:cNvPicPr>
+          <p:nvPr/>
+        </p:nvPicPr>
+        <p:blipFill>
+          <a:blip r:embed="rId3" cstate="print"/>
+          <a:srcRect/>
+          <a:stretch>
+            <a:fillRect/>
+          </a:stretch>
+        </p:blipFill>
+        <p:spPr bwMode="auto">
+          <a:xfrm>
+            <a:off x="1115616" y="3645024"/>
+            <a:ext cx="6926612" cy="1794123"/>
+          </a:xfrm>
+          <a:prstGeom prst="rect">
+            <a:avLst/>
+          </a:prstGeom>
+          <a:noFill/>
+          <a:ln w="9525">
+            <a:noFill/>
+            <a:miter lim="800000"/>
+            <a:headEnd/>
+            <a:tailEnd/>
+          </a:ln>
+          <a:effectLst/>
+        </p:spPr>
+      </p:pic>
+      <p:pic>
+        <p:nvPicPr>
+          <p:cNvPr id="5" name="Picture 2"/>
+          <p:cNvPicPr>
+            <a:picLocks noChangeAspect="1" noChangeArrowheads="1"/>
+          </p:cNvPicPr>
+          <p:nvPr/>
+        </p:nvPicPr>
+        <p:blipFill>
+          <a:blip r:embed="rId4" cstate="print"/>
+          <a:srcRect/>
+          <a:stretch>
+            <a:fillRect/>
+          </a:stretch>
+        </p:blipFill>
+        <p:spPr bwMode="auto">
+          <a:xfrm>
+            <a:off x="179512" y="2276872"/>
+            <a:ext cx="8784976" cy="994132"/>
+          </a:xfrm>
+          <a:prstGeom prst="rect">
+            <a:avLst/>
+          </a:prstGeom>
+          <a:noFill/>
+          <a:ln w="9525">
+            <a:noFill/>
+            <a:miter lim="800000"/>
+            <a:headEnd/>
+            <a:tailEnd/>
+          </a:ln>
+          <a:effectLst/>
+        </p:spPr>
+      </p:pic>
+      <p:pic>
+        <p:nvPicPr>
+          <p:cNvPr id="6" name="Picture 3"/>
+          <p:cNvPicPr>
+            <a:picLocks noChangeAspect="1" noChangeArrowheads="1"/>
+          </p:cNvPicPr>
+          <p:nvPr/>
+        </p:nvPicPr>
+        <p:blipFill>
+          <a:blip r:embed="rId5" cstate="print"/>
+          <a:srcRect/>
+          <a:stretch>
+            <a:fillRect/>
+          </a:stretch>
+        </p:blipFill>
+        <p:spPr bwMode="auto">
+          <a:xfrm>
+            <a:off x="323528" y="5517232"/>
+            <a:ext cx="8383587" cy="1104900"/>
+          </a:xfrm>
+          <a:prstGeom prst="rect">
+            <a:avLst/>
+          </a:prstGeom>
+          <a:noFill/>
+          <a:ln w="9525">
+            <a:noFill/>
+            <a:miter lim="800000"/>
+            <a:headEnd/>
+            <a:tailEnd/>
+          </a:ln>
+          <a:effectLst/>
+        </p:spPr>
+      </p:pic>
+    </p:spTree>
+  </p:cSld>
+  <p:clrMapOvr>
+    <a:masterClrMapping/>
+  </p:clrMapOvr>
+</p:sld>
+</file>
+
+<file path=ppt/slides/slide5.xml><?xml version="1.0" encoding="utf-8"?>
 <p:sld xmlns:a="http://schemas.openxmlformats.org/drawingml/2006/main" xmlns:r="http://schemas.openxmlformats.org/officeDocument/2006/relationships" xmlns:p="http://schemas.openxmlformats.org/presentationml/2006/main">
   <p:cSld>
     <p:spTree>
@@ -3360,8 +4230,8 @@
         </p:blipFill>
         <p:spPr bwMode="auto">
           <a:xfrm>
-            <a:off x="179512" y="260648"/>
-            <a:ext cx="8784976" cy="994132"/>
+            <a:off x="467544" y="1196752"/>
+            <a:ext cx="8136904" cy="4892868"/>
           </a:xfrm>
           <a:prstGeom prst="rect">
             <a:avLst/>
@@ -3378,318 +4248,67 @@
       </p:pic>
       <p:sp>
         <p:nvSpPr>
-          <p:cNvPr id="6" name="ZoneTexte 5"/>
-          <p:cNvSpPr txBox="1"/>
+          <p:cNvPr id="3" name="Titre 1"/>
+          <p:cNvSpPr txBox="1">
+            <a:spLocks/>
+          </p:cNvSpPr>
           <p:nvPr/>
         </p:nvSpPr>
         <p:spPr>
           <a:xfrm>
-            <a:off x="2195736" y="2204864"/>
-            <a:ext cx="4896544" cy="2308324"/>
+            <a:off x="457200" y="274638"/>
+            <a:ext cx="8229600" cy="1143000"/>
           </a:xfrm>
           <a:prstGeom prst="rect">
             <a:avLst/>
           </a:prstGeom>
-          <a:noFill/>
-        </p:spPr>
-        <p:txBody>
-          <a:bodyPr wrap="square" rtlCol="0">
-            <a:spAutoFit/>
-          </a:bodyPr>
-          <a:lstStyle/>
-          <a:p>
-            <a:r>
-              <a:rPr lang="fr-FR" dirty="0" smtClean="0"/>
-              <a:t>Double problème : </a:t>
-            </a:r>
-            <a:r>
-              <a:rPr lang="fr-FR" dirty="0" err="1" smtClean="0"/>
-              <a:t>alt</a:t>
-            </a:r>
-            <a:r>
-              <a:rPr lang="fr-FR" dirty="0" smtClean="0"/>
-              <a:t> et image au lieu de texte</a:t>
-            </a:r>
-          </a:p>
-          <a:p>
-            <a:r>
-              <a:rPr lang="fr-FR" dirty="0" smtClean="0"/>
-              <a:t>Plus pertinent d’</a:t>
-            </a:r>
-            <a:r>
-              <a:rPr lang="fr-FR" dirty="0" err="1" smtClean="0"/>
-              <a:t>ecrire</a:t>
-            </a:r>
-            <a:r>
-              <a:rPr lang="fr-FR" dirty="0" smtClean="0"/>
-              <a:t> le sous-titre pour avoir les mots-clés ainsi que la quantité de mots considéré par les bots et éviter justement de bourrer les </a:t>
-            </a:r>
-            <a:r>
-              <a:rPr lang="fr-FR" dirty="0" err="1" smtClean="0"/>
-              <a:t>alt</a:t>
-            </a:r>
-            <a:r>
-              <a:rPr lang="fr-FR" dirty="0" smtClean="0"/>
-              <a:t> de fausses descriptions, ce qui peut être dangereux pour le </a:t>
-            </a:r>
-            <a:r>
-              <a:rPr lang="fr-FR" dirty="0" err="1" smtClean="0"/>
-              <a:t>referencement</a:t>
-            </a:r>
-            <a:r>
-              <a:rPr lang="fr-FR" dirty="0" smtClean="0"/>
-              <a:t> du site + performances du site </a:t>
-            </a:r>
-            <a:r>
-              <a:rPr lang="fr-FR" dirty="0" err="1" smtClean="0"/>
-              <a:t>ameliorées</a:t>
-            </a:r>
-            <a:r>
-              <a:rPr lang="fr-FR" dirty="0" smtClean="0"/>
-              <a:t> </a:t>
-            </a:r>
-            <a:r>
-              <a:rPr lang="fr-FR" dirty="0" smtClean="0"/>
-              <a:t>car moins d’images à charger + impossibilité de lecture audio</a:t>
-            </a:r>
-          </a:p>
-        </p:txBody>
-      </p:sp>
-      <p:pic>
-        <p:nvPicPr>
-          <p:cNvPr id="2051" name="Picture 3"/>
-          <p:cNvPicPr>
-            <a:picLocks noChangeAspect="1" noChangeArrowheads="1"/>
-          </p:cNvPicPr>
-          <p:nvPr/>
-        </p:nvPicPr>
-        <p:blipFill>
-          <a:blip r:embed="rId3" cstate="print"/>
-          <a:srcRect/>
-          <a:stretch>
-            <a:fillRect/>
-          </a:stretch>
-        </p:blipFill>
-        <p:spPr bwMode="auto">
-          <a:xfrm>
-            <a:off x="395536" y="5157192"/>
-            <a:ext cx="8383587" cy="1104900"/>
-          </a:xfrm>
-          <a:prstGeom prst="rect">
-            <a:avLst/>
-          </a:prstGeom>
-          <a:noFill/>
-          <a:ln w="9525">
-            <a:noFill/>
-            <a:miter lim="800000"/>
-            <a:headEnd/>
-            <a:tailEnd/>
-          </a:ln>
-          <a:effectLst/>
-        </p:spPr>
-      </p:pic>
-    </p:spTree>
-  </p:cSld>
-  <p:clrMapOvr>
-    <a:masterClrMapping/>
-  </p:clrMapOvr>
-</p:sld>
-</file>
-
-<file path=ppt/slides/slide5.xml><?xml version="1.0" encoding="utf-8"?>
-<p:sld xmlns:a="http://schemas.openxmlformats.org/drawingml/2006/main" xmlns:r="http://schemas.openxmlformats.org/officeDocument/2006/relationships" xmlns:p="http://schemas.openxmlformats.org/presentationml/2006/main">
-  <p:cSld>
-    <p:spTree>
-      <p:nvGrpSpPr>
-        <p:cNvPr id="1" name=""/>
-        <p:cNvGrpSpPr/>
-        <p:nvPr/>
-      </p:nvGrpSpPr>
-      <p:grpSpPr>
-        <a:xfrm>
-          <a:off x="0" y="0"/>
-          <a:ext cx="0" cy="0"/>
-          <a:chOff x="0" y="0"/>
-          <a:chExt cx="0" cy="0"/>
-        </a:xfrm>
-      </p:grpSpPr>
-      <p:sp>
-        <p:nvSpPr>
-          <p:cNvPr id="4" name="ZoneTexte 3"/>
-          <p:cNvSpPr txBox="1"/>
-          <p:nvPr/>
-        </p:nvSpPr>
-        <p:spPr>
-          <a:xfrm>
-            <a:off x="1475656" y="260648"/>
-            <a:ext cx="5832648" cy="646331"/>
-          </a:xfrm>
-          <a:prstGeom prst="rect">
-            <a:avLst/>
-          </a:prstGeom>
-          <a:noFill/>
-        </p:spPr>
-        <p:txBody>
-          <a:bodyPr wrap="square" rtlCol="0">
-            <a:spAutoFit/>
-          </a:bodyPr>
-          <a:lstStyle/>
-          <a:p>
-            <a:pPr algn="ctr"/>
-            <a:r>
-              <a:rPr lang="fr-FR" dirty="0" smtClean="0"/>
-              <a:t>-Explicit </a:t>
-            </a:r>
-            <a:r>
-              <a:rPr lang="fr-FR" dirty="0" err="1" smtClean="0"/>
-              <a:t>width</a:t>
-            </a:r>
-            <a:r>
-              <a:rPr lang="fr-FR" dirty="0" smtClean="0"/>
-              <a:t> and </a:t>
-            </a:r>
-            <a:r>
-              <a:rPr lang="fr-FR" dirty="0" err="1" smtClean="0"/>
-              <a:t>height</a:t>
-            </a:r>
-            <a:r>
-              <a:rPr lang="fr-FR" dirty="0" smtClean="0"/>
-              <a:t> </a:t>
-            </a:r>
-            <a:r>
-              <a:rPr lang="fr-FR" dirty="0" err="1" smtClean="0"/>
-              <a:t>is</a:t>
-            </a:r>
-            <a:r>
-              <a:rPr lang="fr-FR" dirty="0" smtClean="0"/>
-              <a:t> </a:t>
-            </a:r>
-            <a:r>
-              <a:rPr lang="fr-FR" dirty="0" err="1" smtClean="0"/>
-              <a:t>better</a:t>
-            </a:r>
-            <a:endParaRPr lang="fr-FR" dirty="0" smtClean="0"/>
-          </a:p>
-          <a:p>
-            <a:pPr algn="ctr"/>
-            <a:r>
-              <a:rPr lang="fr-FR" dirty="0" smtClean="0"/>
-              <a:t>-</a:t>
-            </a:r>
-            <a:r>
-              <a:rPr lang="fr-FR" dirty="0" err="1" smtClean="0"/>
-              <a:t>Better</a:t>
-            </a:r>
-            <a:r>
-              <a:rPr lang="fr-FR" dirty="0" smtClean="0"/>
-              <a:t> encode </a:t>
-            </a:r>
-            <a:r>
-              <a:rPr lang="fr-FR" dirty="0" err="1" smtClean="0"/>
-              <a:t>with</a:t>
-            </a:r>
-            <a:r>
-              <a:rPr lang="fr-FR" dirty="0" smtClean="0"/>
-              <a:t> </a:t>
-            </a:r>
-            <a:r>
-              <a:rPr lang="fr-FR" dirty="0" err="1" smtClean="0"/>
-              <a:t>png</a:t>
-            </a:r>
-            <a:r>
-              <a:rPr lang="fr-FR" dirty="0" smtClean="0"/>
-              <a:t> and </a:t>
-            </a:r>
-            <a:r>
-              <a:rPr lang="fr-FR" dirty="0" err="1" smtClean="0"/>
-              <a:t>avoid</a:t>
-            </a:r>
-            <a:r>
-              <a:rPr lang="fr-FR" dirty="0" smtClean="0"/>
-              <a:t> </a:t>
-            </a:r>
-            <a:r>
-              <a:rPr lang="fr-FR" dirty="0" err="1" smtClean="0"/>
-              <a:t>jpg</a:t>
-            </a:r>
-            <a:r>
-              <a:rPr lang="fr-FR" dirty="0" smtClean="0"/>
-              <a:t> and </a:t>
-            </a:r>
-            <a:r>
-              <a:rPr lang="fr-FR" dirty="0" err="1" smtClean="0"/>
-              <a:t>bmp</a:t>
-            </a:r>
-            <a:endParaRPr lang="fr-FR" dirty="0" smtClean="0"/>
-          </a:p>
-        </p:txBody>
-      </p:sp>
-      <p:pic>
-        <p:nvPicPr>
-          <p:cNvPr id="1026" name="Picture 2"/>
-          <p:cNvPicPr>
-            <a:picLocks noChangeAspect="1" noChangeArrowheads="1"/>
-          </p:cNvPicPr>
-          <p:nvPr/>
-        </p:nvPicPr>
-        <p:blipFill>
-          <a:blip r:embed="rId2" cstate="print"/>
-          <a:srcRect/>
-          <a:stretch>
-            <a:fillRect/>
-          </a:stretch>
-        </p:blipFill>
-        <p:spPr bwMode="auto">
-          <a:xfrm>
-            <a:off x="3386138" y="3224213"/>
-            <a:ext cx="2371725" cy="409575"/>
-          </a:xfrm>
-          <a:prstGeom prst="rect">
-            <a:avLst/>
-          </a:prstGeom>
-          <a:noFill/>
-          <a:ln w="9525">
-            <a:noFill/>
-            <a:miter lim="800000"/>
-            <a:headEnd/>
-            <a:tailEnd/>
-          </a:ln>
-          <a:effectLst/>
-        </p:spPr>
-      </p:pic>
-      <p:pic>
-        <p:nvPicPr>
-          <p:cNvPr id="1027" name="Picture 3"/>
-          <p:cNvPicPr>
-            <a:picLocks noChangeAspect="1" noChangeArrowheads="1"/>
-          </p:cNvPicPr>
-          <p:nvPr/>
-        </p:nvPicPr>
-        <p:blipFill>
-          <a:blip r:embed="rId3" cstate="print"/>
-          <a:srcRect/>
-          <a:stretch>
-            <a:fillRect/>
-          </a:stretch>
-        </p:blipFill>
-        <p:spPr bwMode="auto">
-          <a:xfrm>
-            <a:off x="3347864" y="3717032"/>
-            <a:ext cx="2381250" cy="400050"/>
-          </a:xfrm>
-          <a:prstGeom prst="rect">
-            <a:avLst/>
-          </a:prstGeom>
-          <a:noFill/>
-          <a:ln w="9525">
-            <a:noFill/>
-            <a:miter lim="800000"/>
-            <a:headEnd/>
-            <a:tailEnd/>
-          </a:ln>
-          <a:effectLst/>
-        </p:spPr>
-      </p:pic>
+        </p:spPr>
+        <p:txBody>
+          <a:bodyPr/>
+          <a:lstStyle/>
+          <a:p>
+            <a:pPr marL="0" marR="0" lvl="0" indent="0" algn="ctr" defTabSz="914400" rtl="0" eaLnBrk="1" fontAlgn="auto" latinLnBrk="0" hangingPunct="1">
+              <a:lnSpc>
+                <a:spcPct val="100000"/>
+              </a:lnSpc>
+              <a:spcBef>
+                <a:spcPct val="0"/>
+              </a:spcBef>
+              <a:spcAft>
+                <a:spcPts val="0"/>
+              </a:spcAft>
+              <a:buClrTx/>
+              <a:buSzTx/>
+              <a:buFontTx/>
+              <a:buNone/>
+              <a:tabLst/>
+              <a:defRPr/>
+            </a:pPr>
+            <a:r>
+              <a:rPr lang="fr-FR" sz="2800" dirty="0" smtClean="0">
+                <a:latin typeface="+mj-lt"/>
+                <a:ea typeface="+mj-ea"/>
+                <a:cs typeface="+mj-cs"/>
+              </a:rPr>
+              <a:t>Alt des images</a:t>
+            </a:r>
+            <a:endParaRPr kumimoji="0" lang="fr-FR" sz="2800" b="0" i="0" u="none" strike="noStrike" kern="1200" cap="none" spc="0" normalizeH="0" baseline="0" noProof="0" dirty="0">
+              <a:ln>
+                <a:noFill/>
+              </a:ln>
+              <a:solidFill>
+                <a:schemeClr val="tx1"/>
+              </a:solidFill>
+              <a:effectLst/>
+              <a:uLnTx/>
+              <a:uFillTx/>
+              <a:latin typeface="+mj-lt"/>
+              <a:ea typeface="+mj-ea"/>
+              <a:cs typeface="+mj-cs"/>
+            </a:endParaRPr>
+          </a:p>
+        </p:txBody>
+      </p:sp>
     </p:spTree>
   </p:cSld>
   <p:clrMapOvr>
@@ -3715,9 +4334,98 @@
           <a:chExt cx="0" cy="0"/>
         </a:xfrm>
       </p:grpSpPr>
+      <p:sp>
+        <p:nvSpPr>
+          <p:cNvPr id="5" name="Titre 1"/>
+          <p:cNvSpPr txBox="1">
+            <a:spLocks/>
+          </p:cNvSpPr>
+          <p:nvPr/>
+        </p:nvSpPr>
+        <p:spPr>
+          <a:xfrm>
+            <a:off x="457200" y="274638"/>
+            <a:ext cx="8229600" cy="1143000"/>
+          </a:xfrm>
+          <a:prstGeom prst="rect">
+            <a:avLst/>
+          </a:prstGeom>
+        </p:spPr>
+        <p:txBody>
+          <a:bodyPr/>
+          <a:lstStyle/>
+          <a:p>
+            <a:pPr marL="0" marR="0" lvl="0" indent="0" algn="ctr" defTabSz="914400" rtl="0" eaLnBrk="1" fontAlgn="auto" latinLnBrk="0" hangingPunct="1">
+              <a:lnSpc>
+                <a:spcPct val="100000"/>
+              </a:lnSpc>
+              <a:spcBef>
+                <a:spcPct val="0"/>
+              </a:spcBef>
+              <a:spcAft>
+                <a:spcPts val="0"/>
+              </a:spcAft>
+              <a:buClrTx/>
+              <a:buSzTx/>
+              <a:buFontTx/>
+              <a:buNone/>
+              <a:tabLst/>
+              <a:defRPr/>
+            </a:pPr>
+            <a:r>
+              <a:rPr kumimoji="0" lang="fr-FR" sz="2800" b="0" i="0" u="none" strike="noStrike" kern="1200" cap="none" spc="0" normalizeH="0" baseline="0" noProof="0" dirty="0" smtClean="0">
+                <a:ln>
+                  <a:noFill/>
+                </a:ln>
+                <a:solidFill>
+                  <a:schemeClr val="tx1"/>
+                </a:solidFill>
+                <a:effectLst/>
+                <a:uLnTx/>
+                <a:uFillTx/>
+                <a:latin typeface="+mj-lt"/>
+                <a:ea typeface="+mj-ea"/>
+                <a:cs typeface="+mj-cs"/>
+              </a:rPr>
+              <a:t>Le</a:t>
+            </a:r>
+            <a:r>
+              <a:rPr kumimoji="0" lang="fr-FR" sz="2800" b="0" i="0" u="none" strike="noStrike" kern="1200" cap="none" spc="0" normalizeH="0" noProof="0" dirty="0" smtClean="0">
+                <a:ln>
+                  <a:noFill/>
+                </a:ln>
+                <a:solidFill>
+                  <a:schemeClr val="tx1"/>
+                </a:solidFill>
+                <a:effectLst/>
+                <a:uLnTx/>
+                <a:uFillTx/>
+                <a:latin typeface="+mj-lt"/>
+                <a:ea typeface="+mj-ea"/>
+                <a:cs typeface="+mj-cs"/>
+              </a:rPr>
+              <a:t> contraste</a:t>
+            </a:r>
+            <a:endParaRPr kumimoji="0" lang="fr-FR" sz="2800" b="0" i="0" u="none" strike="noStrike" kern="1200" cap="none" spc="0" normalizeH="0" baseline="0" noProof="0" dirty="0">
+              <a:ln>
+                <a:noFill/>
+              </a:ln>
+              <a:solidFill>
+                <a:schemeClr val="tx1"/>
+              </a:solidFill>
+              <a:effectLst/>
+              <a:uLnTx/>
+              <a:uFillTx/>
+              <a:latin typeface="+mj-lt"/>
+              <a:ea typeface="+mj-ea"/>
+              <a:cs typeface="+mj-cs"/>
+            </a:endParaRPr>
+          </a:p>
+        </p:txBody>
+      </p:sp>
       <p:pic>
         <p:nvPicPr>
-          <p:cNvPr id="2050" name="Picture 2"/>
+          <p:cNvPr id="6" name="Picture 2"/>
           <p:cNvPicPr>
             <a:picLocks noChangeAspect="1" noChangeArrowheads="1"/>
           </p:cNvPicPr>
@@ -3732,8 +4440,8 @@
         </p:blipFill>
         <p:spPr bwMode="auto">
           <a:xfrm>
-            <a:off x="1835696" y="404664"/>
-            <a:ext cx="5633517" cy="3387536"/>
+            <a:off x="0" y="1628800"/>
+            <a:ext cx="9144000" cy="3415144"/>
           </a:xfrm>
           <a:prstGeom prst="rect">
             <a:avLst/>
@@ -3757,163 +4465,6 @@
 </file>
 
 <file path=ppt/slides/slide7.xml><?xml version="1.0" encoding="utf-8"?>
-<p:sld xmlns:a="http://schemas.openxmlformats.org/drawingml/2006/main" xmlns:r="http://schemas.openxmlformats.org/officeDocument/2006/relationships" xmlns:p="http://schemas.openxmlformats.org/presentationml/2006/main">
-  <p:cSld>
-    <p:spTree>
-      <p:nvGrpSpPr>
-        <p:cNvPr id="1" name=""/>
-        <p:cNvGrpSpPr/>
-        <p:nvPr/>
-      </p:nvGrpSpPr>
-      <p:grpSpPr>
-        <a:xfrm>
-          <a:off x="0" y="0"/>
-          <a:ext cx="0" cy="0"/>
-          <a:chOff x="0" y="0"/>
-          <a:chExt cx="0" cy="0"/>
-        </a:xfrm>
-      </p:grpSpPr>
-      <p:pic>
-        <p:nvPicPr>
-          <p:cNvPr id="3074" name="Picture 2"/>
-          <p:cNvPicPr>
-            <a:picLocks noChangeAspect="1" noChangeArrowheads="1"/>
-          </p:cNvPicPr>
-          <p:nvPr/>
-        </p:nvPicPr>
-        <p:blipFill>
-          <a:blip r:embed="rId2" cstate="print"/>
-          <a:srcRect/>
-          <a:stretch>
-            <a:fillRect/>
-          </a:stretch>
-        </p:blipFill>
-        <p:spPr bwMode="auto">
-          <a:xfrm>
-            <a:off x="179512" y="332656"/>
-            <a:ext cx="8853339" cy="3306587"/>
-          </a:xfrm>
-          <a:prstGeom prst="rect">
-            <a:avLst/>
-          </a:prstGeom>
-          <a:noFill/>
-          <a:ln w="9525">
-            <a:noFill/>
-            <a:miter lim="800000"/>
-            <a:headEnd/>
-            <a:tailEnd/>
-          </a:ln>
-          <a:effectLst/>
-        </p:spPr>
-      </p:pic>
-      <p:pic>
-        <p:nvPicPr>
-          <p:cNvPr id="3075" name="Picture 3"/>
-          <p:cNvPicPr>
-            <a:picLocks noChangeAspect="1" noChangeArrowheads="1"/>
-          </p:cNvPicPr>
-          <p:nvPr/>
-        </p:nvPicPr>
-        <p:blipFill>
-          <a:blip r:embed="rId3" cstate="print"/>
-          <a:srcRect/>
-          <a:stretch>
-            <a:fillRect/>
-          </a:stretch>
-        </p:blipFill>
-        <p:spPr bwMode="auto">
-          <a:xfrm>
-            <a:off x="323528" y="3789040"/>
-            <a:ext cx="4962525" cy="733425"/>
-          </a:xfrm>
-          <a:prstGeom prst="rect">
-            <a:avLst/>
-          </a:prstGeom>
-          <a:noFill/>
-          <a:ln w="9525">
-            <a:noFill/>
-            <a:miter lim="800000"/>
-            <a:headEnd/>
-            <a:tailEnd/>
-          </a:ln>
-          <a:effectLst/>
-        </p:spPr>
-      </p:pic>
-      <p:pic>
-        <p:nvPicPr>
-          <p:cNvPr id="3076" name="Picture 4"/>
-          <p:cNvPicPr>
-            <a:picLocks noChangeAspect="1" noChangeArrowheads="1"/>
-          </p:cNvPicPr>
-          <p:nvPr/>
-        </p:nvPicPr>
-        <p:blipFill>
-          <a:blip r:embed="rId4" cstate="print"/>
-          <a:srcRect/>
-          <a:stretch>
-            <a:fillRect/>
-          </a:stretch>
-        </p:blipFill>
-        <p:spPr bwMode="auto">
-          <a:xfrm>
-            <a:off x="323528" y="4869160"/>
-            <a:ext cx="4600575" cy="733425"/>
-          </a:xfrm>
-          <a:prstGeom prst="rect">
-            <a:avLst/>
-          </a:prstGeom>
-          <a:noFill/>
-          <a:ln w="9525">
-            <a:noFill/>
-            <a:miter lim="800000"/>
-            <a:headEnd/>
-            <a:tailEnd/>
-          </a:ln>
-          <a:effectLst/>
-        </p:spPr>
-      </p:pic>
-      <p:pic>
-        <p:nvPicPr>
-          <p:cNvPr id="3077" name="Picture 5"/>
-          <p:cNvPicPr>
-            <a:picLocks noChangeAspect="1" noChangeArrowheads="1"/>
-          </p:cNvPicPr>
-          <p:nvPr/>
-        </p:nvPicPr>
-        <p:blipFill>
-          <a:blip r:embed="rId5" cstate="print"/>
-          <a:srcRect/>
-          <a:stretch>
-            <a:fillRect/>
-          </a:stretch>
-        </p:blipFill>
-        <p:spPr bwMode="auto">
-          <a:xfrm>
-            <a:off x="395536" y="5715000"/>
-            <a:ext cx="4448175" cy="1143000"/>
-          </a:xfrm>
-          <a:prstGeom prst="rect">
-            <a:avLst/>
-          </a:prstGeom>
-          <a:noFill/>
-          <a:ln w="9525">
-            <a:noFill/>
-            <a:miter lim="800000"/>
-            <a:headEnd/>
-            <a:tailEnd/>
-          </a:ln>
-          <a:effectLst/>
-        </p:spPr>
-      </p:pic>
-    </p:spTree>
-  </p:cSld>
-  <p:clrMapOvr>
-    <a:masterClrMapping/>
-  </p:clrMapOvr>
-</p:sld>
-</file>
-
-<file path=ppt/slides/slide8.xml><?xml version="1.0" encoding="utf-8"?>
 <p:sld xmlns:a="http://schemas.openxmlformats.org/drawingml/2006/main" xmlns:r="http://schemas.openxmlformats.org/officeDocument/2006/relationships" xmlns:p="http://schemas.openxmlformats.org/presentationml/2006/main">
   <p:cSld>
     <p:spTree>
@@ -3947,7 +4498,7 @@
         </p:blipFill>
         <p:spPr bwMode="auto">
           <a:xfrm>
-            <a:off x="323528" y="3284984"/>
+            <a:off x="1619672" y="3356992"/>
             <a:ext cx="5616624" cy="3380079"/>
           </a:xfrm>
           <a:prstGeom prst="rect">
@@ -3980,8 +4531,132 @@
         </p:blipFill>
         <p:spPr bwMode="auto">
           <a:xfrm>
-            <a:off x="467544" y="0"/>
+            <a:off x="1691680" y="0"/>
             <a:ext cx="5495247" cy="3284984"/>
+          </a:xfrm>
+          <a:prstGeom prst="rect">
+            <a:avLst/>
+          </a:prstGeom>
+          <a:noFill/>
+          <a:ln w="9525">
+            <a:noFill/>
+            <a:miter lim="800000"/>
+            <a:headEnd/>
+            <a:tailEnd/>
+          </a:ln>
+          <a:effectLst/>
+        </p:spPr>
+      </p:pic>
+    </p:spTree>
+  </p:cSld>
+  <p:clrMapOvr>
+    <a:masterClrMapping/>
+  </p:clrMapOvr>
+</p:sld>
+</file>
+
+<file path=ppt/slides/slide8.xml><?xml version="1.0" encoding="utf-8"?>
+<p:sld xmlns:a="http://schemas.openxmlformats.org/drawingml/2006/main" xmlns:r="http://schemas.openxmlformats.org/officeDocument/2006/relationships" xmlns:p="http://schemas.openxmlformats.org/presentationml/2006/main">
+  <p:cSld>
+    <p:spTree>
+      <p:nvGrpSpPr>
+        <p:cNvPr id="1" name=""/>
+        <p:cNvGrpSpPr/>
+        <p:nvPr/>
+      </p:nvGrpSpPr>
+      <p:grpSpPr>
+        <a:xfrm>
+          <a:off x="0" y="0"/>
+          <a:ext cx="0" cy="0"/>
+          <a:chOff x="0" y="0"/>
+          <a:chExt cx="0" cy="0"/>
+        </a:xfrm>
+      </p:grpSpPr>
+      <p:pic>
+        <p:nvPicPr>
+          <p:cNvPr id="2" name="Picture 3"/>
+          <p:cNvPicPr>
+            <a:picLocks noChangeAspect="1" noChangeArrowheads="1"/>
+          </p:cNvPicPr>
+          <p:nvPr/>
+        </p:nvPicPr>
+        <p:blipFill>
+          <a:blip r:embed="rId2" cstate="print"/>
+          <a:srcRect/>
+          <a:stretch>
+            <a:fillRect/>
+          </a:stretch>
+        </p:blipFill>
+        <p:spPr bwMode="auto">
+          <a:xfrm>
+            <a:off x="1907704" y="1628800"/>
+            <a:ext cx="5112568" cy="733425"/>
+          </a:xfrm>
+          <a:prstGeom prst="rect">
+            <a:avLst/>
+          </a:prstGeom>
+          <a:noFill/>
+          <a:ln w="9525">
+            <a:noFill/>
+            <a:miter lim="800000"/>
+            <a:headEnd/>
+            <a:tailEnd/>
+          </a:ln>
+          <a:effectLst/>
+        </p:spPr>
+      </p:pic>
+      <p:pic>
+        <p:nvPicPr>
+          <p:cNvPr id="3" name="Picture 4"/>
+          <p:cNvPicPr>
+            <a:picLocks noChangeAspect="1" noChangeArrowheads="1"/>
+          </p:cNvPicPr>
+          <p:nvPr/>
+        </p:nvPicPr>
+        <p:blipFill>
+          <a:blip r:embed="rId3" cstate="print"/>
+          <a:srcRect/>
+          <a:stretch>
+            <a:fillRect/>
+          </a:stretch>
+        </p:blipFill>
+        <p:spPr bwMode="auto">
+          <a:xfrm>
+            <a:off x="1979712" y="2708920"/>
+            <a:ext cx="4896544" cy="733425"/>
+          </a:xfrm>
+          <a:prstGeom prst="rect">
+            <a:avLst/>
+          </a:prstGeom>
+          <a:noFill/>
+          <a:ln w="9525">
+            <a:noFill/>
+            <a:miter lim="800000"/>
+            <a:headEnd/>
+            <a:tailEnd/>
+          </a:ln>
+          <a:effectLst/>
+        </p:spPr>
+      </p:pic>
+      <p:pic>
+        <p:nvPicPr>
+          <p:cNvPr id="4" name="Picture 5"/>
+          <p:cNvPicPr>
+            <a:picLocks noChangeAspect="1" noChangeArrowheads="1"/>
+          </p:cNvPicPr>
+          <p:nvPr/>
+        </p:nvPicPr>
+        <p:blipFill>
+          <a:blip r:embed="rId4" cstate="print"/>
+          <a:srcRect/>
+          <a:stretch>
+            <a:fillRect/>
+          </a:stretch>
+        </p:blipFill>
+        <p:spPr bwMode="auto">
+          <a:xfrm>
+            <a:off x="2051720" y="3501008"/>
+            <a:ext cx="4824536" cy="1143000"/>
           </a:xfrm>
           <a:prstGeom prst="rect">
             <a:avLst/>
@@ -4021,9 +4696,98 @@
           <a:chExt cx="0" cy="0"/>
         </a:xfrm>
       </p:grpSpPr>
+      <p:sp>
+        <p:nvSpPr>
+          <p:cNvPr id="4" name="Titre 1"/>
+          <p:cNvSpPr txBox="1">
+            <a:spLocks/>
+          </p:cNvSpPr>
+          <p:nvPr/>
+        </p:nvSpPr>
+        <p:spPr>
+          <a:xfrm>
+            <a:off x="457200" y="274638"/>
+            <a:ext cx="8229600" cy="1143000"/>
+          </a:xfrm>
+          <a:prstGeom prst="rect">
+            <a:avLst/>
+          </a:prstGeom>
+        </p:spPr>
+        <p:txBody>
+          <a:bodyPr/>
+          <a:lstStyle/>
+          <a:p>
+            <a:pPr marL="0" marR="0" lvl="0" indent="0" algn="ctr" defTabSz="914400" rtl="0" eaLnBrk="1" fontAlgn="auto" latinLnBrk="0" hangingPunct="1">
+              <a:lnSpc>
+                <a:spcPct val="100000"/>
+              </a:lnSpc>
+              <a:spcBef>
+                <a:spcPct val="0"/>
+              </a:spcBef>
+              <a:spcAft>
+                <a:spcPts val="0"/>
+              </a:spcAft>
+              <a:buClrTx/>
+              <a:buSzTx/>
+              <a:buFontTx/>
+              <a:buNone/>
+              <a:tabLst/>
+              <a:defRPr/>
+            </a:pPr>
+            <a:r>
+              <a:rPr kumimoji="0" lang="fr-FR" sz="2800" b="0" i="0" u="none" strike="noStrike" kern="1200" cap="none" spc="0" normalizeH="0" baseline="0" noProof="0" dirty="0" smtClean="0">
+                <a:ln>
+                  <a:noFill/>
+                </a:ln>
+                <a:solidFill>
+                  <a:schemeClr val="tx1"/>
+                </a:solidFill>
+                <a:effectLst/>
+                <a:uLnTx/>
+                <a:uFillTx/>
+                <a:latin typeface="+mj-lt"/>
+                <a:ea typeface="+mj-ea"/>
+                <a:cs typeface="+mj-cs"/>
+              </a:rPr>
+              <a:t>Le</a:t>
+            </a:r>
+            <a:r>
+              <a:rPr kumimoji="0" lang="fr-FR" sz="2800" b="0" i="0" u="none" strike="noStrike" kern="1200" cap="none" spc="0" normalizeH="0" noProof="0" dirty="0" smtClean="0">
+                <a:ln>
+                  <a:noFill/>
+                </a:ln>
+                <a:solidFill>
+                  <a:schemeClr val="tx1"/>
+                </a:solidFill>
+                <a:effectLst/>
+                <a:uLnTx/>
+                <a:uFillTx/>
+                <a:latin typeface="+mj-lt"/>
+                <a:ea typeface="+mj-ea"/>
+                <a:cs typeface="+mj-cs"/>
+              </a:rPr>
+              <a:t> Contenu</a:t>
+            </a:r>
+            <a:endParaRPr kumimoji="0" lang="fr-FR" sz="2800" b="0" i="0" u="none" strike="noStrike" kern="1200" cap="none" spc="0" normalizeH="0" baseline="0" noProof="0" dirty="0">
+              <a:ln>
+                <a:noFill/>
+              </a:ln>
+              <a:solidFill>
+                <a:schemeClr val="tx1"/>
+              </a:solidFill>
+              <a:effectLst/>
+              <a:uLnTx/>
+              <a:uFillTx/>
+              <a:latin typeface="+mj-lt"/>
+              <a:ea typeface="+mj-ea"/>
+              <a:cs typeface="+mj-cs"/>
+            </a:endParaRPr>
+          </a:p>
+        </p:txBody>
+      </p:sp>
       <p:pic>
         <p:nvPicPr>
-          <p:cNvPr id="4098" name="Picture 2"/>
+          <p:cNvPr id="2050" name="Picture 2"/>
           <p:cNvPicPr>
             <a:picLocks noChangeAspect="1" noChangeArrowheads="1"/>
           </p:cNvPicPr>
@@ -4031,15 +4795,15 @@
         </p:nvPicPr>
         <p:blipFill>
           <a:blip r:embed="rId2" cstate="print"/>
-          <a:srcRect/>
+          <a:srcRect r="4325"/>
           <a:stretch>
             <a:fillRect/>
           </a:stretch>
         </p:blipFill>
         <p:spPr bwMode="auto">
           <a:xfrm>
-            <a:off x="971600" y="332656"/>
-            <a:ext cx="4352925" cy="714375"/>
+            <a:off x="0" y="1340768"/>
+            <a:ext cx="9144000" cy="2808312"/>
           </a:xfrm>
           <a:prstGeom prst="rect">
             <a:avLst/>
@@ -4054,94 +4818,72 @@
           <a:effectLst/>
         </p:spPr>
       </p:pic>
-      <p:sp>
-        <p:nvSpPr>
-          <p:cNvPr id="3" name="ZoneTexte 2"/>
-          <p:cNvSpPr txBox="1"/>
+      <p:pic>
+        <p:nvPicPr>
+          <p:cNvPr id="2051" name="Picture 3"/>
+          <p:cNvPicPr>
+            <a:picLocks noChangeAspect="1" noChangeArrowheads="1"/>
+          </p:cNvPicPr>
           <p:nvPr/>
-        </p:nvSpPr>
-        <p:spPr>
-          <a:xfrm>
-            <a:off x="971600" y="1484784"/>
-            <a:ext cx="2088232" cy="2031325"/>
+        </p:nvPicPr>
+        <p:blipFill>
+          <a:blip r:embed="rId3" cstate="print"/>
+          <a:srcRect/>
+          <a:stretch>
+            <a:fillRect/>
+          </a:stretch>
+        </p:blipFill>
+        <p:spPr bwMode="auto">
+          <a:xfrm>
+            <a:off x="0" y="5013176"/>
+            <a:ext cx="4286250" cy="904875"/>
           </a:xfrm>
           <a:prstGeom prst="rect">
             <a:avLst/>
           </a:prstGeom>
           <a:noFill/>
-        </p:spPr>
-        <p:txBody>
-          <a:bodyPr wrap="square" rtlCol="0">
-            <a:spAutoFit/>
-          </a:bodyPr>
-          <a:lstStyle/>
-          <a:p>
-            <a:r>
-              <a:rPr lang="fr-FR" i="1" dirty="0" smtClean="0"/>
-              <a:t>empêche </a:t>
-            </a:r>
-            <a:r>
-              <a:rPr lang="fr-FR" i="1" dirty="0" smtClean="0"/>
-              <a:t>les robots d'exploration de la plupart des moteurs de recherche</a:t>
-            </a:r>
-            <a:r>
-              <a:rPr lang="fr-FR" dirty="0" smtClean="0"/>
-              <a:t> d'indexer une page de votre site</a:t>
-            </a:r>
-            <a:endParaRPr lang="fr-FR" dirty="0"/>
-          </a:p>
-        </p:txBody>
-      </p:sp>
-      <p:sp>
-        <p:nvSpPr>
-          <p:cNvPr id="4" name="ZoneTexte 3"/>
-          <p:cNvSpPr txBox="1"/>
+          <a:ln w="9525">
+            <a:noFill/>
+            <a:miter lim="800000"/>
+            <a:headEnd/>
+            <a:tailEnd/>
+          </a:ln>
+          <a:effectLst/>
+        </p:spPr>
+      </p:pic>
+      <p:pic>
+        <p:nvPicPr>
+          <p:cNvPr id="2052" name="Picture 4"/>
+          <p:cNvPicPr>
+            <a:picLocks noChangeAspect="1" noChangeArrowheads="1"/>
+          </p:cNvPicPr>
           <p:nvPr/>
-        </p:nvSpPr>
-        <p:spPr>
-          <a:xfrm>
-            <a:off x="3419872" y="1556792"/>
-            <a:ext cx="2088232" cy="1477328"/>
+        </p:nvPicPr>
+        <p:blipFill>
+          <a:blip r:embed="rId4" cstate="print"/>
+          <a:srcRect/>
+          <a:stretch>
+            <a:fillRect/>
+          </a:stretch>
+        </p:blipFill>
+        <p:spPr bwMode="auto">
+          <a:xfrm>
+            <a:off x="5364088" y="5301208"/>
+            <a:ext cx="2343150" cy="323850"/>
           </a:xfrm>
           <a:prstGeom prst="rect">
             <a:avLst/>
           </a:prstGeom>
           <a:noFill/>
-        </p:spPr>
-        <p:txBody>
-          <a:bodyPr wrap="square" rtlCol="0">
-            <a:spAutoFit/>
-          </a:bodyPr>
-          <a:lstStyle/>
-          <a:p>
-            <a:r>
-              <a:rPr lang="fr-FR" i="1" dirty="0" smtClean="0"/>
-              <a:t>empêche </a:t>
-            </a:r>
-            <a:r>
-              <a:rPr lang="fr-FR" i="1" dirty="0" smtClean="0"/>
-              <a:t>les robots d'exploration de </a:t>
-            </a:r>
-            <a:r>
-              <a:rPr lang="fr-FR" i="1" dirty="0" err="1" smtClean="0"/>
-              <a:t>google</a:t>
-            </a:r>
-            <a:r>
-              <a:rPr lang="fr-FR" i="1" dirty="0" smtClean="0"/>
-              <a:t> </a:t>
-            </a:r>
-            <a:r>
-              <a:rPr lang="fr-FR" dirty="0" smtClean="0"/>
-              <a:t>d'indexer </a:t>
-            </a:r>
-            <a:r>
-              <a:rPr lang="fr-FR" dirty="0" smtClean="0"/>
-              <a:t>une page de votre site</a:t>
-            </a:r>
-            <a:endParaRPr lang="fr-FR" dirty="0"/>
-          </a:p>
-        </p:txBody>
-      </p:sp>
+          <a:ln w="9525">
+            <a:noFill/>
+            <a:miter lim="800000"/>
+            <a:headEnd/>
+            <a:tailEnd/>
+          </a:ln>
+          <a:effectLst/>
+        </p:spPr>
+      </p:pic>
     </p:spTree>
   </p:cSld>
   <p:clrMapOvr>

</xml_diff>